<commit_message>
chore: rename package to `player`
</commit_message>
<xml_diff>
--- a/man/figures/logo.pptx
+++ b/man/figures/logo.pptx
@@ -243,7 +243,7 @@
           <a:p>
             <a:fld id="{8AA7341E-E8D5-574D-9C77-42D65F8270B5}" type="datetimeFigureOut">
               <a:rPr lang="en-US" smtClean="0"/>
-              <a:t>7/3/23</a:t>
+              <a:t>10/27/23</a:t>
             </a:fld>
             <a:endParaRPr lang="en-US"/>
           </a:p>
@@ -413,7 +413,7 @@
           <a:p>
             <a:fld id="{8AA7341E-E8D5-574D-9C77-42D65F8270B5}" type="datetimeFigureOut">
               <a:rPr lang="en-US" smtClean="0"/>
-              <a:t>7/3/23</a:t>
+              <a:t>10/27/23</a:t>
             </a:fld>
             <a:endParaRPr lang="en-US"/>
           </a:p>
@@ -593,7 +593,7 @@
           <a:p>
             <a:fld id="{8AA7341E-E8D5-574D-9C77-42D65F8270B5}" type="datetimeFigureOut">
               <a:rPr lang="en-US" smtClean="0"/>
-              <a:t>7/3/23</a:t>
+              <a:t>10/27/23</a:t>
             </a:fld>
             <a:endParaRPr lang="en-US"/>
           </a:p>
@@ -763,7 +763,7 @@
           <a:p>
             <a:fld id="{8AA7341E-E8D5-574D-9C77-42D65F8270B5}" type="datetimeFigureOut">
               <a:rPr lang="en-US" smtClean="0"/>
-              <a:t>7/3/23</a:t>
+              <a:t>10/27/23</a:t>
             </a:fld>
             <a:endParaRPr lang="en-US"/>
           </a:p>
@@ -1007,7 +1007,7 @@
           <a:p>
             <a:fld id="{8AA7341E-E8D5-574D-9C77-42D65F8270B5}" type="datetimeFigureOut">
               <a:rPr lang="en-US" smtClean="0"/>
-              <a:t>7/3/23</a:t>
+              <a:t>10/27/23</a:t>
             </a:fld>
             <a:endParaRPr lang="en-US"/>
           </a:p>
@@ -1239,7 +1239,7 @@
           <a:p>
             <a:fld id="{8AA7341E-E8D5-574D-9C77-42D65F8270B5}" type="datetimeFigureOut">
               <a:rPr lang="en-US" smtClean="0"/>
-              <a:t>7/3/23</a:t>
+              <a:t>10/27/23</a:t>
             </a:fld>
             <a:endParaRPr lang="en-US"/>
           </a:p>
@@ -1606,7 +1606,7 @@
           <a:p>
             <a:fld id="{8AA7341E-E8D5-574D-9C77-42D65F8270B5}" type="datetimeFigureOut">
               <a:rPr lang="en-US" smtClean="0"/>
-              <a:t>7/3/23</a:t>
+              <a:t>10/27/23</a:t>
             </a:fld>
             <a:endParaRPr lang="en-US"/>
           </a:p>
@@ -1724,7 +1724,7 @@
           <a:p>
             <a:fld id="{8AA7341E-E8D5-574D-9C77-42D65F8270B5}" type="datetimeFigureOut">
               <a:rPr lang="en-US" smtClean="0"/>
-              <a:t>7/3/23</a:t>
+              <a:t>10/27/23</a:t>
             </a:fld>
             <a:endParaRPr lang="en-US"/>
           </a:p>
@@ -1819,7 +1819,7 @@
           <a:p>
             <a:fld id="{8AA7341E-E8D5-574D-9C77-42D65F8270B5}" type="datetimeFigureOut">
               <a:rPr lang="en-US" smtClean="0"/>
-              <a:t>7/3/23</a:t>
+              <a:t>10/27/23</a:t>
             </a:fld>
             <a:endParaRPr lang="en-US"/>
           </a:p>
@@ -2096,7 +2096,7 @@
           <a:p>
             <a:fld id="{8AA7341E-E8D5-574D-9C77-42D65F8270B5}" type="datetimeFigureOut">
               <a:rPr lang="en-US" smtClean="0"/>
-              <a:t>7/3/23</a:t>
+              <a:t>10/27/23</a:t>
             </a:fld>
             <a:endParaRPr lang="en-US"/>
           </a:p>
@@ -2353,7 +2353,7 @@
           <a:p>
             <a:fld id="{8AA7341E-E8D5-574D-9C77-42D65F8270B5}" type="datetimeFigureOut">
               <a:rPr lang="en-US" smtClean="0"/>
-              <a:t>7/3/23</a:t>
+              <a:t>10/27/23</a:t>
             </a:fld>
             <a:endParaRPr lang="en-US"/>
           </a:p>
@@ -2566,7 +2566,7 @@
           <a:p>
             <a:fld id="{8AA7341E-E8D5-574D-9C77-42D65F8270B5}" type="datetimeFigureOut">
               <a:rPr lang="en-US" smtClean="0"/>
-              <a:t>7/3/23</a:t>
+              <a:t>10/27/23</a:t>
             </a:fld>
             <a:endParaRPr lang="en-US"/>
           </a:p>
@@ -3237,8 +3237,8 @@
         </p:nvSpPr>
         <p:spPr>
           <a:xfrm rot="20627742">
-            <a:off x="8682149" y="9492875"/>
-            <a:ext cx="3887078" cy="4720134"/>
+            <a:off x="8832527" y="9471467"/>
+            <a:ext cx="3887078" cy="5797866"/>
           </a:xfrm>
           <a:prstGeom prst="rect">
             <a:avLst/>
@@ -3275,46 +3275,6 @@
           </a:p>
         </p:txBody>
       </p:sp>
-      <p:pic>
-        <p:nvPicPr>
-          <p:cNvPr id="5" name="Picture 4" descr="A video game controller with buttons&#10;&#10;Description automatically generated with medium confidence">
-            <a:extLst>
-              <a:ext uri="{FF2B5EF4-FFF2-40B4-BE49-F238E27FC236}">
-                <a16:creationId xmlns:a16="http://schemas.microsoft.com/office/drawing/2014/main" id="{34578434-5FD5-0DE0-2010-246CE751C51C}"/>
-              </a:ext>
-            </a:extLst>
-          </p:cNvPr>
-          <p:cNvPicPr>
-            <a:picLocks noChangeAspect="1"/>
-          </p:cNvPicPr>
-          <p:nvPr/>
-        </p:nvPicPr>
-        <p:blipFill rotWithShape="1">
-          <a:blip r:embed="rId2">
-            <a:clrChange>
-              <a:clrFrom>
-                <a:srgbClr val="D4D4D4"/>
-              </a:clrFrom>
-              <a:clrTo>
-                <a:srgbClr val="D4D4D4">
-                  <a:alpha val="0"/>
-                </a:srgbClr>
-              </a:clrTo>
-            </a:clrChange>
-          </a:blip>
-          <a:srcRect l="41103" t="17684" r="43062" b="60077"/>
-          <a:stretch/>
-        </p:blipFill>
-        <p:spPr>
-          <a:xfrm rot="20700000">
-            <a:off x="8485725" y="9844495"/>
-            <a:ext cx="4564441" cy="3129923"/>
-          </a:xfrm>
-          <a:prstGeom prst="rect">
-            <a:avLst/>
-          </a:prstGeom>
-        </p:spPr>
-      </p:pic>
       <p:sp>
         <p:nvSpPr>
           <p:cNvPr id="7" name="Hexagon 6">
@@ -3393,7 +3353,7 @@
         </p:blipFill>
         <p:spPr>
           <a:xfrm rot="20700000">
-            <a:off x="9309825" y="13238846"/>
+            <a:off x="9190554" y="12761772"/>
             <a:ext cx="3708079" cy="1826800"/>
           </a:xfrm>
           <a:prstGeom prst="rect">
@@ -3401,6 +3361,47 @@
           </a:prstGeom>
         </p:spPr>
       </p:pic>
+      <p:sp>
+        <p:nvSpPr>
+          <p:cNvPr id="2" name="TextBox 1">
+            <a:extLst>
+              <a:ext uri="{FF2B5EF4-FFF2-40B4-BE49-F238E27FC236}">
+                <a16:creationId xmlns:a16="http://schemas.microsoft.com/office/drawing/2014/main" id="{15D12808-0FBD-C360-0DB5-89CE8282717A}"/>
+              </a:ext>
+            </a:extLst>
+          </p:cNvPr>
+          <p:cNvSpPr txBox="1"/>
+          <p:nvPr/>
+        </p:nvSpPr>
+        <p:spPr>
+          <a:xfrm rot="20593698">
+            <a:off x="7071655" y="8646853"/>
+            <a:ext cx="6255737" cy="3477875"/>
+          </a:xfrm>
+          <a:prstGeom prst="rect">
+            <a:avLst/>
+          </a:prstGeom>
+          <a:noFill/>
+        </p:spPr>
+        <p:txBody>
+          <a:bodyPr wrap="square" rtlCol="0">
+            <a:spAutoFit/>
+          </a:bodyPr>
+          <a:lstStyle/>
+          <a:p>
+            <a:pPr algn="ctr"/>
+            <a:r>
+              <a:rPr lang="en-US" sz="22000" dirty="0">
+                <a:solidFill>
+                  <a:srgbClr val="4A524E"/>
+                </a:solidFill>
+                <a:latin typeface="SNES" panose="02000500000000000000" pitchFamily="2" charset="0"/>
+              </a:rPr>
+              <a:t>PLAYER</a:t>
+            </a:r>
+          </a:p>
+        </p:txBody>
+      </p:sp>
     </p:spTree>
     <p:extLst>
       <p:ext uri="{BB962C8B-B14F-4D97-AF65-F5344CB8AC3E}">

</xml_diff>